<commit_message>
added maniscript for selected slides
</commit_message>
<xml_diff>
--- a/LMKVGPNSE2013.pptx
+++ b/LMKVGPNSE2013.pptx
@@ -897,24 +897,19 @@
           <a:lstStyle/>
           <a:p>
             <a:r>
-              <a:rPr lang="en-GB" dirty="0" smtClean="0"/>
-              <a:t>The work presented here is joint work with</a:t>
-            </a:r>
-            <a:r>
-              <a:rPr lang="en-GB" baseline="0" dirty="0" smtClean="0"/>
-              <a:t> Sami Evangelista at University of Paris Nord.</a:t>
-            </a:r>
-          </a:p>
-          <a:p>
-            <a:endParaRPr lang="en-GB" baseline="0" dirty="0" smtClean="0"/>
-          </a:p>
-          <a:p>
-            <a:r>
               <a:rPr lang="da-DK" dirty="0" err="1" smtClean="0"/>
               <a:t>This</a:t>
             </a:r>
             <a:r>
               <a:rPr lang="da-DK" dirty="0" smtClean="0"/>
+              <a:t> is </a:t>
+            </a:r>
+            <a:r>
+              <a:rPr lang="da-DK" dirty="0" err="1" smtClean="0"/>
+              <a:t>some</a:t>
+            </a:r>
+            <a:r>
+              <a:rPr lang="da-DK" dirty="0" smtClean="0"/>
               <a:t> </a:t>
             </a:r>
             <a:r>
@@ -922,20 +917,81 @@
               <a:t>work</a:t>
             </a:r>
             <a:r>
+              <a:rPr lang="da-DK" dirty="0" smtClean="0"/>
+              <a:t> done </a:t>
+            </a:r>
+            <a:r>
+              <a:rPr lang="da-DK" dirty="0" err="1" smtClean="0"/>
+              <a:t>mostly</a:t>
+            </a:r>
+            <a:r>
+              <a:rPr lang="da-DK" dirty="0" smtClean="0"/>
+              <a:t> by </a:t>
+            </a:r>
+            <a:r>
+              <a:rPr lang="da-DK" dirty="0" err="1" smtClean="0"/>
+              <a:t>one</a:t>
+            </a:r>
+            <a:r>
+              <a:rPr lang="da-DK" dirty="0" smtClean="0"/>
+              <a:t> of </a:t>
+            </a:r>
+            <a:r>
+              <a:rPr lang="da-DK" dirty="0" err="1" smtClean="0"/>
+              <a:t>my</a:t>
+            </a:r>
+            <a:r>
+              <a:rPr lang="da-DK" dirty="0" smtClean="0"/>
+              <a:t> </a:t>
+            </a:r>
+            <a:r>
+              <a:rPr lang="da-DK" dirty="0" err="1" smtClean="0"/>
+              <a:t>master’s</a:t>
+            </a:r>
+            <a:r>
+              <a:rPr lang="da-DK" dirty="0" smtClean="0"/>
+              <a:t> </a:t>
+            </a:r>
+            <a:r>
+              <a:rPr lang="da-DK" dirty="0" err="1" smtClean="0"/>
+              <a:t>thesis</a:t>
+            </a:r>
+            <a:r>
+              <a:rPr lang="da-DK" dirty="0" smtClean="0"/>
+              <a:t> students – </a:t>
+            </a:r>
+            <a:r>
+              <a:rPr lang="da-DK" dirty="0" err="1" smtClean="0"/>
+              <a:t>Vegard</a:t>
+            </a:r>
+            <a:r>
+              <a:rPr lang="da-DK" dirty="0" smtClean="0"/>
+              <a:t> </a:t>
+            </a:r>
+            <a:r>
+              <a:rPr lang="da-DK" dirty="0" err="1" smtClean="0"/>
+              <a:t>Veiset</a:t>
+            </a:r>
+            <a:r>
+              <a:rPr lang="da-DK" dirty="0" smtClean="0"/>
+              <a:t>.</a:t>
+            </a:r>
+          </a:p>
+          <a:p>
+            <a:endParaRPr lang="da-DK" dirty="0" smtClean="0"/>
+          </a:p>
+          <a:p>
+            <a:r>
+              <a:rPr lang="da-DK" dirty="0" smtClean="0"/>
+              <a:t>It</a:t>
+            </a:r>
+            <a:r>
               <a:rPr lang="da-DK" baseline="0" dirty="0" smtClean="0"/>
               <a:t> is </a:t>
             </a:r>
             <a:r>
               <a:rPr lang="da-DK" baseline="0" dirty="0" err="1" smtClean="0"/>
-              <a:t>linked</a:t>
-            </a:r>
-            <a:r>
-              <a:rPr lang="da-DK" baseline="0" dirty="0" smtClean="0"/>
-              <a:t> to the </a:t>
-            </a:r>
-            <a:r>
-              <a:rPr lang="da-DK" baseline="0" dirty="0" err="1" smtClean="0"/>
-              <a:t>sweep-line</a:t>
+              <a:t>about</a:t>
             </a:r>
             <a:r>
               <a:rPr lang="da-DK" baseline="0" dirty="0" smtClean="0"/>
@@ -943,7 +999,23 @@
             </a:r>
             <a:r>
               <a:rPr lang="da-DK" baseline="0" dirty="0" err="1" smtClean="0"/>
-              <a:t>method</a:t>
+              <a:t>how</a:t>
+            </a:r>
+            <a:r>
+              <a:rPr lang="da-DK" baseline="0" dirty="0" smtClean="0"/>
+              <a:t> to </a:t>
+            </a:r>
+            <a:r>
+              <a:rPr lang="da-DK" baseline="0" dirty="0" err="1" smtClean="0"/>
+              <a:t>transform</a:t>
+            </a:r>
+            <a:r>
+              <a:rPr lang="da-DK" baseline="0" dirty="0" smtClean="0"/>
+              <a:t> CPN models of </a:t>
+            </a:r>
+            <a:r>
+              <a:rPr lang="da-DK" baseline="0" dirty="0" err="1" smtClean="0"/>
+              <a:t>communication</a:t>
             </a:r>
             <a:r>
               <a:rPr lang="da-DK" baseline="0" dirty="0" smtClean="0"/>
@@ -951,23 +1023,7 @@
             </a:r>
             <a:r>
               <a:rPr lang="da-DK" baseline="0" dirty="0" err="1" smtClean="0"/>
-              <a:t>which</a:t>
-            </a:r>
-            <a:r>
-              <a:rPr lang="da-DK" baseline="0" dirty="0" smtClean="0"/>
-              <a:t> is </a:t>
-            </a:r>
-            <a:r>
-              <a:rPr lang="da-DK" baseline="0" dirty="0" err="1" smtClean="0"/>
-              <a:t>one</a:t>
-            </a:r>
-            <a:r>
-              <a:rPr lang="da-DK" baseline="0" dirty="0" smtClean="0"/>
-              <a:t> of out a </a:t>
-            </a:r>
-            <a:r>
-              <a:rPr lang="da-DK" baseline="0" dirty="0" err="1" smtClean="0"/>
-              <a:t>wide</a:t>
+              <a:t>protocols</a:t>
             </a:r>
             <a:r>
               <a:rPr lang="da-DK" baseline="0" dirty="0" smtClean="0"/>
@@ -975,15 +1031,7 @@
             </a:r>
             <a:r>
               <a:rPr lang="da-DK" baseline="0" dirty="0" err="1" smtClean="0"/>
-              <a:t>collection</a:t>
-            </a:r>
-            <a:r>
-              <a:rPr lang="da-DK" baseline="0" dirty="0" smtClean="0"/>
-              <a:t> of </a:t>
-            </a:r>
-            <a:r>
-              <a:rPr lang="da-DK" baseline="0" dirty="0" err="1" smtClean="0"/>
-              <a:t>techniques</a:t>
+              <a:t>into</a:t>
             </a:r>
             <a:r>
               <a:rPr lang="da-DK" baseline="0" dirty="0" smtClean="0"/>
@@ -991,31 +1039,7 @@
             </a:r>
             <a:r>
               <a:rPr lang="da-DK" baseline="0" dirty="0" err="1" smtClean="0"/>
-              <a:t>available</a:t>
-            </a:r>
-            <a:r>
-              <a:rPr lang="da-DK" baseline="0" dirty="0" smtClean="0"/>
-              <a:t> to </a:t>
-            </a:r>
-            <a:r>
-              <a:rPr lang="da-DK" baseline="0" dirty="0" err="1" smtClean="0"/>
-              <a:t>alleviate</a:t>
-            </a:r>
-            <a:r>
-              <a:rPr lang="da-DK" baseline="0" dirty="0" smtClean="0"/>
-              <a:t> the </a:t>
-            </a:r>
-            <a:r>
-              <a:rPr lang="da-DK" baseline="0" dirty="0" err="1" smtClean="0"/>
-              <a:t>effect</a:t>
-            </a:r>
-            <a:r>
-              <a:rPr lang="da-DK" baseline="0" dirty="0" smtClean="0"/>
-              <a:t> of the </a:t>
-            </a:r>
-            <a:r>
-              <a:rPr lang="da-DK" baseline="0" dirty="0" err="1" smtClean="0"/>
-              <a:t>state</a:t>
+              <a:t>code</a:t>
             </a:r>
             <a:r>
               <a:rPr lang="da-DK" baseline="0" dirty="0" smtClean="0"/>
@@ -1023,13 +1047,84 @@
             </a:r>
             <a:r>
               <a:rPr lang="da-DK" baseline="0" dirty="0" err="1" smtClean="0"/>
-              <a:t>explosion</a:t>
+              <a:t>that</a:t>
             </a:r>
             <a:r>
               <a:rPr lang="da-DK" baseline="0" dirty="0" smtClean="0"/>
-              <a:t> problem. </a:t>
-            </a:r>
-            <a:endParaRPr lang="en-GB" dirty="0"/>
+              <a:t> </a:t>
+            </a:r>
+            <a:r>
+              <a:rPr lang="da-DK" baseline="0" dirty="0" err="1" smtClean="0"/>
+              <a:t>can</a:t>
+            </a:r>
+            <a:r>
+              <a:rPr lang="da-DK" baseline="0" dirty="0" smtClean="0"/>
+              <a:t> </a:t>
+            </a:r>
+            <a:r>
+              <a:rPr lang="da-DK" baseline="0" dirty="0" err="1" smtClean="0"/>
+              <a:t>be</a:t>
+            </a:r>
+            <a:r>
+              <a:rPr lang="da-DK" baseline="0" dirty="0" smtClean="0"/>
+              <a:t> </a:t>
+            </a:r>
+            <a:r>
+              <a:rPr lang="da-DK" baseline="0" dirty="0" err="1" smtClean="0"/>
+              <a:t>deployed</a:t>
+            </a:r>
+            <a:r>
+              <a:rPr lang="da-DK" baseline="0" dirty="0" smtClean="0"/>
+              <a:t> and </a:t>
+            </a:r>
+            <a:r>
+              <a:rPr lang="da-DK" baseline="0" dirty="0" err="1" smtClean="0"/>
+              <a:t>executed</a:t>
+            </a:r>
+            <a:r>
+              <a:rPr lang="da-DK" baseline="0" dirty="0" smtClean="0"/>
+              <a:t> </a:t>
+            </a:r>
+            <a:r>
+              <a:rPr lang="da-DK" baseline="0" dirty="0" err="1" smtClean="0"/>
+              <a:t>on</a:t>
+            </a:r>
+            <a:r>
+              <a:rPr lang="da-DK" baseline="0" dirty="0" smtClean="0"/>
+              <a:t> real platforms.</a:t>
+            </a:r>
+          </a:p>
+          <a:p>
+            <a:endParaRPr lang="da-DK" baseline="0" dirty="0" smtClean="0"/>
+          </a:p>
+          <a:p>
+            <a:r>
+              <a:rPr lang="en-GB" dirty="0" smtClean="0"/>
+              <a:t>The motivation</a:t>
+            </a:r>
+            <a:r>
+              <a:rPr lang="en-GB" baseline="0" dirty="0" smtClean="0"/>
+              <a:t> behind this work is that there are many examples where Coloured Petri nets have been successfully applied for modelling, specification, and verification of systems – but it is </a:t>
+            </a:r>
+            <a:r>
+              <a:rPr lang="en-GB" baseline="0" dirty="0" err="1" smtClean="0"/>
+              <a:t>obvioulsy</a:t>
+            </a:r>
+            <a:r>
+              <a:rPr lang="en-GB" baseline="0" dirty="0" smtClean="0"/>
+              <a:t> </a:t>
+            </a:r>
+            <a:r>
+              <a:rPr lang="en-GB" baseline="0" dirty="0" err="1" smtClean="0"/>
+              <a:t>desireabe</a:t>
+            </a:r>
+            <a:r>
+              <a:rPr lang="en-GB" baseline="0" dirty="0" smtClean="0"/>
+              <a:t> to be able to use also the models for automated code generation. </a:t>
+            </a:r>
+          </a:p>
+          <a:p>
+            <a:endParaRPr lang="en-GB" dirty="0" smtClean="0"/>
           </a:p>
         </p:txBody>
       </p:sp>
@@ -1138,79 +1233,7 @@
           <a:bodyPr/>
           <a:lstStyle/>
           <a:p>
-            <a:r>
-              <a:rPr lang="en-GB" smtClean="0"/>
-              <a:t>And the modelling, simulation, verification have yielded useful insight into the </a:t>
-            </a:r>
-            <a:r>
-              <a:rPr lang="en-GB" smtClean="0">
-                <a:solidFill>
-                  <a:srgbClr val="0070C0"/>
-                </a:solidFill>
-              </a:rPr>
-              <a:t>design</a:t>
-            </a:r>
-            <a:r>
-              <a:rPr lang="en-GB" smtClean="0"/>
-              <a:t> and </a:t>
-            </a:r>
-            <a:r>
-              <a:rPr lang="en-GB" smtClean="0">
-                <a:solidFill>
-                  <a:srgbClr val="0070C0"/>
-                </a:solidFill>
-              </a:rPr>
-              <a:t>behaviour</a:t>
-            </a:r>
-            <a:r>
-              <a:rPr lang="en-GB" smtClean="0"/>
-              <a:t> of a system.</a:t>
-            </a:r>
-          </a:p>
-          <a:p>
-            <a:endParaRPr lang="en-GB" smtClean="0"/>
-          </a:p>
-          <a:p>
-            <a:r>
-              <a:rPr lang="en-GB" smtClean="0"/>
-              <a:t>The construction of the model has hopefully indirectly contributed to make, e.g., a manual implementation easier but it would be nice to have some automatic support for code generation.</a:t>
-            </a:r>
-          </a:p>
-          <a:p>
-            <a:endParaRPr lang="en-GB" smtClean="0"/>
-          </a:p>
-          <a:p>
-            <a:r>
-              <a:rPr lang="en-GB" smtClean="0"/>
-              <a:t>But there exists only limited work on automatic code-generation from CPNs:</a:t>
-            </a:r>
-          </a:p>
-          <a:p>
-            <a:endParaRPr lang="en-GB" smtClean="0"/>
-          </a:p>
-          <a:p>
-            <a:r>
-              <a:rPr lang="en-GB" smtClean="0"/>
-              <a:t>A couple of example of simulation-based code generation where the idea is…</a:t>
-            </a:r>
-          </a:p>
-          <a:p>
-            <a:endParaRPr lang="en-GB" smtClean="0"/>
-          </a:p>
-          <a:p>
-            <a:r>
-              <a:rPr lang="en-GB" smtClean="0"/>
-              <a:t>Limited examples of state-space-based due to inhereint problem with state space size and limitation to finite state systems.</a:t>
-            </a:r>
-          </a:p>
-          <a:p>
-            <a:endParaRPr lang="en-GB" smtClean="0"/>
-          </a:p>
-          <a:p>
-            <a:r>
-              <a:rPr lang="en-GB" smtClean="0"/>
-              <a:t>Hardly any work on structure-based code generation despite it obvios advantages compared to simulation and state-space based approaches.</a:t>
-            </a:r>
+            <a:endParaRPr lang="en-GB" dirty="0" smtClean="0"/>
           </a:p>
         </p:txBody>
       </p:sp>
@@ -1355,6 +1378,1053 @@
               <a:t>2</a:t>
             </a:fld>
             <a:endParaRPr lang="da-DK" b="0" smtClean="0"/>
+          </a:p>
+        </p:txBody>
+      </p:sp>
+    </p:spTree>
+  </p:cSld>
+  <p:clrMapOvr>
+    <a:masterClrMapping/>
+  </p:clrMapOvr>
+</p:notes>
+</file>
+
+<file path=ppt/notesSlides/notesSlide3.xml><?xml version="1.0" encoding="utf-8"?>
+<p:notes xmlns:a="http://schemas.openxmlformats.org/drawingml/2006/main" xmlns:r="http://schemas.openxmlformats.org/officeDocument/2006/relationships" xmlns:p="http://schemas.openxmlformats.org/presentationml/2006/main">
+  <p:cSld>
+    <p:spTree>
+      <p:nvGrpSpPr>
+        <p:cNvPr id="1" name=""/>
+        <p:cNvGrpSpPr/>
+        <p:nvPr/>
+      </p:nvGrpSpPr>
+      <p:grpSpPr>
+        <a:xfrm>
+          <a:off x="0" y="0"/>
+          <a:ext cx="0" cy="0"/>
+          <a:chOff x="0" y="0"/>
+          <a:chExt cx="0" cy="0"/>
+        </a:xfrm>
+      </p:grpSpPr>
+      <p:sp>
+        <p:nvSpPr>
+          <p:cNvPr id="2" name="Slide Image Placeholder 1"/>
+          <p:cNvSpPr>
+            <a:spLocks noGrp="1" noRot="1" noChangeAspect="1"/>
+          </p:cNvSpPr>
+          <p:nvPr>
+            <p:ph type="sldImg"/>
+          </p:nvPr>
+        </p:nvSpPr>
+        <p:spPr/>
+      </p:sp>
+      <p:sp>
+        <p:nvSpPr>
+          <p:cNvPr id="3" name="Notes Placeholder 2"/>
+          <p:cNvSpPr>
+            <a:spLocks noGrp="1"/>
+          </p:cNvSpPr>
+          <p:nvPr>
+            <p:ph type="body" idx="1"/>
+          </p:nvPr>
+        </p:nvSpPr>
+        <p:spPr/>
+        <p:txBody>
+          <a:bodyPr>
+            <a:normAutofit/>
+          </a:bodyPr>
+          <a:lstStyle/>
+          <a:p>
+            <a:r>
+              <a:rPr lang="da-DK" dirty="0" smtClean="0"/>
+              <a:t>In </a:t>
+            </a:r>
+            <a:r>
+              <a:rPr lang="da-DK" dirty="0" err="1" smtClean="0"/>
+              <a:t>this</a:t>
+            </a:r>
+            <a:r>
+              <a:rPr lang="da-DK" dirty="0" smtClean="0"/>
+              <a:t> </a:t>
+            </a:r>
+            <a:r>
+              <a:rPr lang="da-DK" dirty="0" err="1" smtClean="0"/>
+              <a:t>work</a:t>
+            </a:r>
+            <a:r>
+              <a:rPr lang="da-DK" dirty="0" smtClean="0"/>
+              <a:t> </a:t>
+            </a:r>
+            <a:r>
+              <a:rPr lang="da-DK" dirty="0" err="1" smtClean="0"/>
+              <a:t>we</a:t>
+            </a:r>
+            <a:r>
+              <a:rPr lang="da-DK" dirty="0" smtClean="0"/>
+              <a:t> </a:t>
+            </a:r>
+            <a:r>
+              <a:rPr lang="da-DK" dirty="0" err="1" smtClean="0"/>
+              <a:t>investigate</a:t>
+            </a:r>
+            <a:r>
+              <a:rPr lang="da-DK" baseline="0" dirty="0" smtClean="0"/>
+              <a:t> </a:t>
+            </a:r>
+            <a:r>
+              <a:rPr lang="da-DK" baseline="0" dirty="0" err="1" smtClean="0"/>
+              <a:t>how</a:t>
+            </a:r>
+            <a:r>
+              <a:rPr lang="da-DK" baseline="0" dirty="0" smtClean="0"/>
+              <a:t> </a:t>
+            </a:r>
+            <a:r>
+              <a:rPr lang="da-DK" baseline="0" dirty="0" err="1" smtClean="0"/>
+              <a:t>this</a:t>
+            </a:r>
+            <a:r>
+              <a:rPr lang="da-DK" baseline="0" dirty="0" smtClean="0"/>
+              <a:t> </a:t>
+            </a:r>
+            <a:r>
+              <a:rPr lang="da-DK" baseline="0" dirty="0" err="1" smtClean="0"/>
+              <a:t>can</a:t>
+            </a:r>
+            <a:r>
+              <a:rPr lang="da-DK" baseline="0" dirty="0" smtClean="0"/>
+              <a:t> </a:t>
+            </a:r>
+            <a:r>
+              <a:rPr lang="da-DK" baseline="0" dirty="0" err="1" smtClean="0"/>
+              <a:t>be</a:t>
+            </a:r>
+            <a:r>
+              <a:rPr lang="da-DK" baseline="0" dirty="0" smtClean="0"/>
+              <a:t> done in the </a:t>
+            </a:r>
+            <a:r>
+              <a:rPr lang="da-DK" baseline="0" dirty="0" err="1" smtClean="0"/>
+              <a:t>context</a:t>
+            </a:r>
+            <a:r>
+              <a:rPr lang="da-DK" baseline="0" dirty="0" smtClean="0"/>
+              <a:t> of an </a:t>
+            </a:r>
+            <a:r>
+              <a:rPr lang="da-DK" baseline="0" dirty="0" err="1" smtClean="0"/>
+              <a:t>industrial</a:t>
+            </a:r>
+            <a:r>
+              <a:rPr lang="da-DK" baseline="0" dirty="0" smtClean="0"/>
+              <a:t> </a:t>
+            </a:r>
+            <a:r>
+              <a:rPr lang="da-DK" baseline="0" dirty="0" err="1" smtClean="0"/>
+              <a:t>example</a:t>
+            </a:r>
+            <a:r>
+              <a:rPr lang="da-DK" baseline="0" dirty="0" smtClean="0"/>
+              <a:t> of a </a:t>
+            </a:r>
+            <a:r>
+              <a:rPr lang="da-DK" baseline="0" dirty="0" err="1" smtClean="0"/>
+              <a:t>communication</a:t>
+            </a:r>
+            <a:r>
+              <a:rPr lang="da-DK" baseline="0" dirty="0" smtClean="0"/>
+              <a:t> </a:t>
+            </a:r>
+            <a:r>
+              <a:rPr lang="da-DK" baseline="0" dirty="0" err="1" smtClean="0"/>
+              <a:t>protocols</a:t>
+            </a:r>
+            <a:r>
+              <a:rPr lang="da-DK" baseline="0" dirty="0" smtClean="0"/>
+              <a:t> – </a:t>
+            </a:r>
+            <a:r>
+              <a:rPr lang="da-DK" baseline="0" dirty="0" err="1" smtClean="0"/>
+              <a:t>namely</a:t>
+            </a:r>
+            <a:r>
+              <a:rPr lang="da-DK" baseline="0" dirty="0" smtClean="0"/>
+              <a:t> the RPL </a:t>
+            </a:r>
+            <a:r>
+              <a:rPr lang="da-DK" baseline="0" dirty="0" err="1" smtClean="0"/>
+              <a:t>protocol</a:t>
+            </a:r>
+            <a:r>
+              <a:rPr lang="da-DK" baseline="0" dirty="0" smtClean="0"/>
+              <a:t> </a:t>
+            </a:r>
+            <a:r>
+              <a:rPr lang="da-DK" baseline="0" dirty="0" err="1" smtClean="0"/>
+              <a:t>currently</a:t>
+            </a:r>
+            <a:r>
+              <a:rPr lang="da-DK" baseline="0" dirty="0" smtClean="0"/>
+              <a:t> </a:t>
+            </a:r>
+            <a:r>
+              <a:rPr lang="da-DK" baseline="0" dirty="0" err="1" smtClean="0"/>
+              <a:t>being</a:t>
+            </a:r>
+            <a:r>
+              <a:rPr lang="da-DK" baseline="0" dirty="0" smtClean="0"/>
+              <a:t> </a:t>
+            </a:r>
+            <a:r>
+              <a:rPr lang="da-DK" baseline="0" dirty="0" err="1" smtClean="0"/>
+              <a:t>developed</a:t>
+            </a:r>
+            <a:r>
+              <a:rPr lang="da-DK" baseline="0" dirty="0" smtClean="0"/>
+              <a:t> by the IETF.</a:t>
+            </a:r>
+          </a:p>
+          <a:p>
+            <a:endParaRPr lang="da-DK" baseline="0" dirty="0" smtClean="0"/>
+          </a:p>
+          <a:p>
+            <a:r>
+              <a:rPr lang="da-DK" baseline="0" dirty="0" smtClean="0"/>
+              <a:t>RPL is a </a:t>
+            </a:r>
+            <a:r>
+              <a:rPr lang="da-DK" baseline="0" dirty="0" err="1" smtClean="0"/>
+              <a:t>routing</a:t>
+            </a:r>
+            <a:r>
+              <a:rPr lang="da-DK" baseline="0" dirty="0" smtClean="0"/>
+              <a:t> </a:t>
+            </a:r>
+            <a:r>
+              <a:rPr lang="da-DK" baseline="0" dirty="0" err="1" smtClean="0"/>
+              <a:t>protocol</a:t>
+            </a:r>
+            <a:r>
+              <a:rPr lang="da-DK" baseline="0" dirty="0" smtClean="0"/>
+              <a:t> for sensor </a:t>
+            </a:r>
+            <a:r>
+              <a:rPr lang="da-DK" baseline="0" dirty="0" err="1" smtClean="0"/>
+              <a:t>networks</a:t>
+            </a:r>
+            <a:r>
+              <a:rPr lang="da-DK" baseline="0" dirty="0" smtClean="0"/>
+              <a:t> </a:t>
+            </a:r>
+            <a:r>
+              <a:rPr lang="da-DK" baseline="0" dirty="0" err="1" smtClean="0"/>
+              <a:t>which</a:t>
+            </a:r>
+            <a:r>
+              <a:rPr lang="da-DK" baseline="0" dirty="0" smtClean="0"/>
+              <a:t> by </a:t>
+            </a:r>
+            <a:r>
+              <a:rPr lang="da-DK" baseline="0" dirty="0" err="1" smtClean="0"/>
+              <a:t>means</a:t>
+            </a:r>
+            <a:r>
+              <a:rPr lang="da-DK" baseline="0" dirty="0" smtClean="0"/>
+              <a:t> of </a:t>
+            </a:r>
+            <a:r>
+              <a:rPr lang="da-DK" baseline="0" dirty="0" err="1" smtClean="0"/>
+              <a:t>exchange</a:t>
+            </a:r>
+            <a:r>
+              <a:rPr lang="da-DK" baseline="0" dirty="0" smtClean="0"/>
+              <a:t> of </a:t>
+            </a:r>
+            <a:r>
+              <a:rPr lang="da-DK" baseline="0" dirty="0" err="1" smtClean="0"/>
+              <a:t>message</a:t>
+            </a:r>
+            <a:r>
+              <a:rPr lang="da-DK" baseline="0" dirty="0" smtClean="0"/>
+              <a:t> </a:t>
+            </a:r>
+            <a:r>
+              <a:rPr lang="da-DK" baseline="0" dirty="0" err="1" smtClean="0"/>
+              <a:t>allows</a:t>
+            </a:r>
+            <a:r>
+              <a:rPr lang="da-DK" baseline="0" dirty="0" smtClean="0"/>
+              <a:t> sensor nodes to </a:t>
+            </a:r>
+            <a:r>
+              <a:rPr lang="da-DK" baseline="0" dirty="0" err="1" smtClean="0"/>
+              <a:t>estabslish</a:t>
+            </a:r>
+            <a:r>
+              <a:rPr lang="da-DK" baseline="0" dirty="0" smtClean="0"/>
+              <a:t> a </a:t>
+            </a:r>
+            <a:r>
+              <a:rPr lang="da-DK" baseline="0" dirty="0" err="1" smtClean="0"/>
+              <a:t>destination-oriented</a:t>
+            </a:r>
+            <a:r>
+              <a:rPr lang="da-DK" baseline="0" dirty="0" smtClean="0"/>
+              <a:t> </a:t>
+            </a:r>
+            <a:r>
+              <a:rPr lang="da-DK" baseline="0" dirty="0" err="1" smtClean="0"/>
+              <a:t>directed</a:t>
+            </a:r>
+            <a:r>
+              <a:rPr lang="da-DK" baseline="0" dirty="0" smtClean="0"/>
+              <a:t> </a:t>
+            </a:r>
+            <a:r>
+              <a:rPr lang="da-DK" baseline="0" dirty="0" err="1" smtClean="0"/>
+              <a:t>acyclic</a:t>
+            </a:r>
+            <a:r>
+              <a:rPr lang="da-DK" baseline="0" dirty="0" smtClean="0"/>
+              <a:t> </a:t>
+            </a:r>
+            <a:r>
+              <a:rPr lang="da-DK" baseline="0" dirty="0" err="1" smtClean="0"/>
+              <a:t>graph</a:t>
+            </a:r>
+            <a:r>
+              <a:rPr lang="da-DK" baseline="0" dirty="0" smtClean="0"/>
+              <a:t> </a:t>
+            </a:r>
+            <a:r>
+              <a:rPr lang="da-DK" baseline="0" dirty="0" err="1" smtClean="0"/>
+              <a:t>that</a:t>
+            </a:r>
+            <a:r>
+              <a:rPr lang="da-DK" baseline="0" dirty="0" smtClean="0"/>
+              <a:t> </a:t>
+            </a:r>
+            <a:r>
+              <a:rPr lang="da-DK" baseline="0" dirty="0" err="1" smtClean="0"/>
+              <a:t>can</a:t>
+            </a:r>
+            <a:r>
+              <a:rPr lang="da-DK" baseline="0" dirty="0" smtClean="0"/>
+              <a:t> </a:t>
+            </a:r>
+            <a:r>
+              <a:rPr lang="da-DK" baseline="0" dirty="0" err="1" smtClean="0"/>
+              <a:t>be</a:t>
+            </a:r>
+            <a:r>
+              <a:rPr lang="da-DK" baseline="0" dirty="0" smtClean="0"/>
+              <a:t> </a:t>
+            </a:r>
+            <a:r>
+              <a:rPr lang="da-DK" baseline="0" dirty="0" err="1" smtClean="0"/>
+              <a:t>used</a:t>
+            </a:r>
+            <a:r>
+              <a:rPr lang="da-DK" baseline="0" dirty="0" smtClean="0"/>
+              <a:t> for </a:t>
+            </a:r>
+            <a:r>
+              <a:rPr lang="da-DK" baseline="0" dirty="0" err="1" smtClean="0"/>
+              <a:t>transmitting</a:t>
+            </a:r>
+            <a:r>
+              <a:rPr lang="da-DK" baseline="0" dirty="0" smtClean="0"/>
+              <a:t> data from a sensor the sink of sine of the </a:t>
+            </a:r>
+            <a:r>
+              <a:rPr lang="da-DK" baseline="0" dirty="0" err="1" smtClean="0"/>
+              <a:t>network</a:t>
+            </a:r>
+            <a:r>
+              <a:rPr lang="da-DK" baseline="0" dirty="0" smtClean="0"/>
+              <a:t>.</a:t>
+            </a:r>
+          </a:p>
+          <a:p>
+            <a:endParaRPr lang="da-DK" baseline="0" dirty="0" smtClean="0"/>
+          </a:p>
+          <a:p>
+            <a:endParaRPr lang="da-DK" dirty="0"/>
+          </a:p>
+        </p:txBody>
+      </p:sp>
+      <p:sp>
+        <p:nvSpPr>
+          <p:cNvPr id="4" name="Slide Number Placeholder 3"/>
+          <p:cNvSpPr>
+            <a:spLocks noGrp="1"/>
+          </p:cNvSpPr>
+          <p:nvPr>
+            <p:ph type="sldNum" sz="quarter" idx="10"/>
+          </p:nvPr>
+        </p:nvSpPr>
+        <p:spPr/>
+        <p:txBody>
+          <a:bodyPr/>
+          <a:lstStyle/>
+          <a:p>
+            <a:pPr>
+              <a:defRPr/>
+            </a:pPr>
+            <a:fld id="{D60486D3-40B4-40D5-91CB-8FD1E3EE2555}" type="slidenum">
+              <a:rPr lang="da-DK" smtClean="0"/>
+              <a:pPr>
+                <a:defRPr/>
+              </a:pPr>
+              <a:t>3</a:t>
+            </a:fld>
+            <a:endParaRPr lang="da-DK"/>
+          </a:p>
+        </p:txBody>
+      </p:sp>
+    </p:spTree>
+  </p:cSld>
+  <p:clrMapOvr>
+    <a:masterClrMapping/>
+  </p:clrMapOvr>
+</p:notes>
+</file>
+
+<file path=ppt/notesSlides/notesSlide4.xml><?xml version="1.0" encoding="utf-8"?>
+<p:notes xmlns:a="http://schemas.openxmlformats.org/drawingml/2006/main" xmlns:r="http://schemas.openxmlformats.org/officeDocument/2006/relationships" xmlns:p="http://schemas.openxmlformats.org/presentationml/2006/main">
+  <p:cSld>
+    <p:spTree>
+      <p:nvGrpSpPr>
+        <p:cNvPr id="1" name=""/>
+        <p:cNvGrpSpPr/>
+        <p:nvPr/>
+      </p:nvGrpSpPr>
+      <p:grpSpPr>
+        <a:xfrm>
+          <a:off x="0" y="0"/>
+          <a:ext cx="0" cy="0"/>
+          <a:chOff x="0" y="0"/>
+          <a:chExt cx="0" cy="0"/>
+        </a:xfrm>
+      </p:grpSpPr>
+      <p:sp>
+        <p:nvSpPr>
+          <p:cNvPr id="2" name="Slide Image Placeholder 1"/>
+          <p:cNvSpPr>
+            <a:spLocks noGrp="1" noRot="1" noChangeAspect="1"/>
+          </p:cNvSpPr>
+          <p:nvPr>
+            <p:ph type="sldImg"/>
+          </p:nvPr>
+        </p:nvSpPr>
+        <p:spPr/>
+      </p:sp>
+      <p:sp>
+        <p:nvSpPr>
+          <p:cNvPr id="3" name="Notes Placeholder 2"/>
+          <p:cNvSpPr>
+            <a:spLocks noGrp="1"/>
+          </p:cNvSpPr>
+          <p:nvPr>
+            <p:ph type="body" idx="1"/>
+          </p:nvPr>
+        </p:nvSpPr>
+        <p:spPr/>
+        <p:txBody>
+          <a:bodyPr>
+            <a:normAutofit/>
+          </a:bodyPr>
+          <a:lstStyle/>
+          <a:p>
+            <a:r>
+              <a:rPr lang="da-DK" dirty="0" smtClean="0"/>
+              <a:t>So </a:t>
+            </a:r>
+            <a:r>
+              <a:rPr lang="da-DK" dirty="0" err="1" smtClean="0"/>
+              <a:t>we</a:t>
+            </a:r>
+            <a:r>
+              <a:rPr lang="da-DK" dirty="0" smtClean="0"/>
+              <a:t> have </a:t>
+            </a:r>
+            <a:r>
+              <a:rPr lang="da-DK" dirty="0" err="1" smtClean="0"/>
+              <a:t>created</a:t>
+            </a:r>
+            <a:r>
+              <a:rPr lang="da-DK" dirty="0" smtClean="0"/>
+              <a:t> a CPN model of the RPL </a:t>
+            </a:r>
+            <a:r>
+              <a:rPr lang="da-DK" dirty="0" err="1" smtClean="0"/>
+              <a:t>protocol</a:t>
+            </a:r>
+            <a:r>
+              <a:rPr lang="da-DK" baseline="0" dirty="0" smtClean="0"/>
+              <a:t> </a:t>
+            </a:r>
+            <a:r>
+              <a:rPr lang="da-DK" baseline="0" dirty="0" err="1" smtClean="0"/>
+              <a:t>that</a:t>
+            </a:r>
+            <a:r>
+              <a:rPr lang="da-DK" baseline="0" dirty="0" smtClean="0"/>
+              <a:t> </a:t>
+            </a:r>
+            <a:r>
+              <a:rPr lang="da-DK" baseline="0" dirty="0" err="1" smtClean="0"/>
+              <a:t>specifies</a:t>
+            </a:r>
+            <a:r>
+              <a:rPr lang="da-DK" baseline="0" dirty="0" smtClean="0"/>
+              <a:t> the operation of the </a:t>
+            </a:r>
+            <a:r>
+              <a:rPr lang="da-DK" baseline="0" dirty="0" err="1" smtClean="0"/>
+              <a:t>protocol</a:t>
+            </a:r>
+            <a:r>
+              <a:rPr lang="da-DK" baseline="0" dirty="0" smtClean="0"/>
+              <a:t> in a platform independent </a:t>
+            </a:r>
+            <a:r>
+              <a:rPr lang="da-DK" baseline="0" dirty="0" err="1" smtClean="0"/>
+              <a:t>manner</a:t>
+            </a:r>
+            <a:r>
+              <a:rPr lang="da-DK" baseline="0" dirty="0" smtClean="0"/>
+              <a:t> and </a:t>
+            </a:r>
+            <a:r>
+              <a:rPr lang="da-DK" baseline="0" dirty="0" err="1" smtClean="0"/>
+              <a:t>we</a:t>
+            </a:r>
+            <a:r>
+              <a:rPr lang="da-DK" baseline="0" dirty="0" smtClean="0"/>
+              <a:t> </a:t>
+            </a:r>
+            <a:r>
+              <a:rPr lang="da-DK" baseline="0" dirty="0" err="1" smtClean="0"/>
+              <a:t>then</a:t>
+            </a:r>
+            <a:r>
+              <a:rPr lang="da-DK" baseline="0" dirty="0" smtClean="0"/>
+              <a:t> </a:t>
+            </a:r>
+            <a:r>
+              <a:rPr lang="da-DK" baseline="0" dirty="0" err="1" smtClean="0"/>
+              <a:t>investigate</a:t>
+            </a:r>
+            <a:r>
+              <a:rPr lang="da-DK" baseline="0" dirty="0" smtClean="0"/>
+              <a:t> ..</a:t>
+            </a:r>
+            <a:endParaRPr lang="da-DK" dirty="0"/>
+          </a:p>
+        </p:txBody>
+      </p:sp>
+      <p:sp>
+        <p:nvSpPr>
+          <p:cNvPr id="4" name="Slide Number Placeholder 3"/>
+          <p:cNvSpPr>
+            <a:spLocks noGrp="1"/>
+          </p:cNvSpPr>
+          <p:nvPr>
+            <p:ph type="sldNum" sz="quarter" idx="10"/>
+          </p:nvPr>
+        </p:nvSpPr>
+        <p:spPr/>
+        <p:txBody>
+          <a:bodyPr/>
+          <a:lstStyle/>
+          <a:p>
+            <a:pPr>
+              <a:defRPr/>
+            </a:pPr>
+            <a:fld id="{D60486D3-40B4-40D5-91CB-8FD1E3EE2555}" type="slidenum">
+              <a:rPr lang="da-DK" smtClean="0"/>
+              <a:pPr>
+                <a:defRPr/>
+              </a:pPr>
+              <a:t>4</a:t>
+            </a:fld>
+            <a:endParaRPr lang="da-DK"/>
+          </a:p>
+        </p:txBody>
+      </p:sp>
+    </p:spTree>
+  </p:cSld>
+  <p:clrMapOvr>
+    <a:masterClrMapping/>
+  </p:clrMapOvr>
+</p:notes>
+</file>
+
+<file path=ppt/notesSlides/notesSlide5.xml><?xml version="1.0" encoding="utf-8"?>
+<p:notes xmlns:a="http://schemas.openxmlformats.org/drawingml/2006/main" xmlns:r="http://schemas.openxmlformats.org/officeDocument/2006/relationships" xmlns:p="http://schemas.openxmlformats.org/presentationml/2006/main">
+  <p:cSld>
+    <p:spTree>
+      <p:nvGrpSpPr>
+        <p:cNvPr id="1" name=""/>
+        <p:cNvGrpSpPr/>
+        <p:nvPr/>
+      </p:nvGrpSpPr>
+      <p:grpSpPr>
+        <a:xfrm>
+          <a:off x="0" y="0"/>
+          <a:ext cx="0" cy="0"/>
+          <a:chOff x="0" y="0"/>
+          <a:chExt cx="0" cy="0"/>
+        </a:xfrm>
+      </p:grpSpPr>
+      <p:sp>
+        <p:nvSpPr>
+          <p:cNvPr id="2" name="Slide Image Placeholder 1"/>
+          <p:cNvSpPr>
+            <a:spLocks noGrp="1" noRot="1" noChangeAspect="1"/>
+          </p:cNvSpPr>
+          <p:nvPr>
+            <p:ph type="sldImg"/>
+          </p:nvPr>
+        </p:nvSpPr>
+        <p:spPr/>
+      </p:sp>
+      <p:sp>
+        <p:nvSpPr>
+          <p:cNvPr id="3" name="Notes Placeholder 2"/>
+          <p:cNvSpPr>
+            <a:spLocks noGrp="1"/>
+          </p:cNvSpPr>
+          <p:nvPr>
+            <p:ph type="body" idx="1"/>
+          </p:nvPr>
+        </p:nvSpPr>
+        <p:spPr/>
+        <p:txBody>
+          <a:bodyPr>
+            <a:normAutofit/>
+          </a:bodyPr>
+          <a:lstStyle/>
+          <a:p>
+            <a:r>
+              <a:rPr lang="da-DK" dirty="0" err="1" smtClean="0"/>
+              <a:t>How</a:t>
+            </a:r>
+            <a:r>
+              <a:rPr lang="da-DK" dirty="0" smtClean="0"/>
+              <a:t> </a:t>
+            </a:r>
+            <a:r>
+              <a:rPr lang="da-DK" dirty="0" err="1" smtClean="0"/>
+              <a:t>this</a:t>
+            </a:r>
+            <a:r>
+              <a:rPr lang="da-DK" dirty="0" smtClean="0"/>
+              <a:t> model </a:t>
+            </a:r>
+            <a:r>
+              <a:rPr lang="da-DK" dirty="0" err="1" smtClean="0"/>
+              <a:t>can</a:t>
+            </a:r>
+            <a:r>
+              <a:rPr lang="da-DK" dirty="0" smtClean="0"/>
+              <a:t> </a:t>
+            </a:r>
+            <a:r>
+              <a:rPr lang="da-DK" dirty="0" err="1" smtClean="0"/>
+              <a:t>be</a:t>
+            </a:r>
+            <a:r>
+              <a:rPr lang="da-DK" dirty="0" smtClean="0"/>
+              <a:t> </a:t>
+            </a:r>
+            <a:r>
+              <a:rPr lang="da-DK" dirty="0" err="1" smtClean="0"/>
+              <a:t>used</a:t>
+            </a:r>
+            <a:r>
+              <a:rPr lang="da-DK" dirty="0" smtClean="0"/>
+              <a:t> to </a:t>
+            </a:r>
+            <a:r>
+              <a:rPr lang="da-DK" dirty="0" err="1" smtClean="0"/>
+              <a:t>generate</a:t>
+            </a:r>
+            <a:r>
+              <a:rPr lang="da-DK" dirty="0" smtClean="0"/>
+              <a:t> an </a:t>
+            </a:r>
+            <a:r>
+              <a:rPr lang="da-DK" dirty="0" err="1" smtClean="0"/>
+              <a:t>implementation</a:t>
+            </a:r>
+            <a:r>
+              <a:rPr lang="da-DK" baseline="0" dirty="0" smtClean="0"/>
+              <a:t> of the </a:t>
+            </a:r>
+            <a:r>
+              <a:rPr lang="da-DK" baseline="0" dirty="0" err="1" smtClean="0"/>
+              <a:t>protocol</a:t>
+            </a:r>
+            <a:r>
+              <a:rPr lang="da-DK" baseline="0" dirty="0" smtClean="0"/>
+              <a:t> for the </a:t>
+            </a:r>
+            <a:r>
+              <a:rPr lang="da-DK" baseline="0" dirty="0" err="1" smtClean="0"/>
+              <a:t>TinyOS</a:t>
+            </a:r>
+            <a:r>
+              <a:rPr lang="da-DK" baseline="0" dirty="0" smtClean="0"/>
+              <a:t> platform </a:t>
+            </a:r>
+            <a:r>
+              <a:rPr lang="da-DK" baseline="0" dirty="0" err="1" smtClean="0"/>
+              <a:t>which</a:t>
+            </a:r>
+            <a:r>
+              <a:rPr lang="da-DK" baseline="0" dirty="0" smtClean="0"/>
+              <a:t> is a operating system </a:t>
+            </a:r>
+            <a:r>
+              <a:rPr lang="da-DK" baseline="0" dirty="0" err="1" smtClean="0"/>
+              <a:t>that</a:t>
+            </a:r>
+            <a:r>
+              <a:rPr lang="da-DK" baseline="0" dirty="0" smtClean="0"/>
+              <a:t> runs </a:t>
+            </a:r>
+            <a:r>
+              <a:rPr lang="da-DK" baseline="0" dirty="0" err="1" smtClean="0"/>
+              <a:t>on</a:t>
+            </a:r>
+            <a:r>
+              <a:rPr lang="da-DK" baseline="0" dirty="0" smtClean="0"/>
+              <a:t> </a:t>
+            </a:r>
+            <a:r>
+              <a:rPr lang="da-DK" baseline="0" dirty="0" err="1" smtClean="0"/>
+              <a:t>such</a:t>
+            </a:r>
+            <a:r>
+              <a:rPr lang="da-DK" baseline="0" dirty="0" smtClean="0"/>
+              <a:t> small </a:t>
+            </a:r>
+            <a:r>
+              <a:rPr lang="da-DK" baseline="0" dirty="0" err="1" smtClean="0"/>
+              <a:t>devices</a:t>
+            </a:r>
+            <a:r>
+              <a:rPr lang="da-DK" baseline="0" dirty="0" smtClean="0"/>
+              <a:t>.</a:t>
+            </a:r>
+            <a:endParaRPr lang="da-DK" dirty="0"/>
+          </a:p>
+        </p:txBody>
+      </p:sp>
+      <p:sp>
+        <p:nvSpPr>
+          <p:cNvPr id="4" name="Slide Number Placeholder 3"/>
+          <p:cNvSpPr>
+            <a:spLocks noGrp="1"/>
+          </p:cNvSpPr>
+          <p:nvPr>
+            <p:ph type="sldNum" sz="quarter" idx="10"/>
+          </p:nvPr>
+        </p:nvSpPr>
+        <p:spPr/>
+        <p:txBody>
+          <a:bodyPr/>
+          <a:lstStyle/>
+          <a:p>
+            <a:pPr>
+              <a:defRPr/>
+            </a:pPr>
+            <a:fld id="{D60486D3-40B4-40D5-91CB-8FD1E3EE2555}" type="slidenum">
+              <a:rPr lang="da-DK" smtClean="0"/>
+              <a:pPr>
+                <a:defRPr/>
+              </a:pPr>
+              <a:t>5</a:t>
+            </a:fld>
+            <a:endParaRPr lang="da-DK"/>
+          </a:p>
+        </p:txBody>
+      </p:sp>
+    </p:spTree>
+  </p:cSld>
+  <p:clrMapOvr>
+    <a:masterClrMapping/>
+  </p:clrMapOvr>
+</p:notes>
+</file>
+
+<file path=ppt/notesSlides/notesSlide6.xml><?xml version="1.0" encoding="utf-8"?>
+<p:notes xmlns:a="http://schemas.openxmlformats.org/drawingml/2006/main" xmlns:r="http://schemas.openxmlformats.org/officeDocument/2006/relationships" xmlns:p="http://schemas.openxmlformats.org/presentationml/2006/main">
+  <p:cSld>
+    <p:spTree>
+      <p:nvGrpSpPr>
+        <p:cNvPr id="1" name=""/>
+        <p:cNvGrpSpPr/>
+        <p:nvPr/>
+      </p:nvGrpSpPr>
+      <p:grpSpPr>
+        <a:xfrm>
+          <a:off x="0" y="0"/>
+          <a:ext cx="0" cy="0"/>
+          <a:chOff x="0" y="0"/>
+          <a:chExt cx="0" cy="0"/>
+        </a:xfrm>
+      </p:grpSpPr>
+      <p:sp>
+        <p:nvSpPr>
+          <p:cNvPr id="2" name="Slide Image Placeholder 1"/>
+          <p:cNvSpPr>
+            <a:spLocks noGrp="1" noRot="1" noChangeAspect="1"/>
+          </p:cNvSpPr>
+          <p:nvPr>
+            <p:ph type="sldImg"/>
+          </p:nvPr>
+        </p:nvSpPr>
+        <p:spPr/>
+      </p:sp>
+      <p:sp>
+        <p:nvSpPr>
+          <p:cNvPr id="3" name="Notes Placeholder 2"/>
+          <p:cNvSpPr>
+            <a:spLocks noGrp="1"/>
+          </p:cNvSpPr>
+          <p:nvPr>
+            <p:ph type="body" idx="1"/>
+          </p:nvPr>
+        </p:nvSpPr>
+        <p:spPr/>
+        <p:txBody>
+          <a:bodyPr>
+            <a:normAutofit/>
+          </a:bodyPr>
+          <a:lstStyle/>
+          <a:p>
+            <a:r>
+              <a:rPr lang="da-DK" dirty="0" smtClean="0"/>
+              <a:t>The </a:t>
+            </a:r>
+            <a:r>
+              <a:rPr lang="da-DK" dirty="0" err="1" smtClean="0"/>
+              <a:t>main</a:t>
+            </a:r>
+            <a:r>
+              <a:rPr lang="da-DK" dirty="0" smtClean="0"/>
+              <a:t> </a:t>
+            </a:r>
+            <a:r>
+              <a:rPr lang="da-DK" dirty="0" err="1" smtClean="0"/>
+              <a:t>result</a:t>
+            </a:r>
+            <a:r>
+              <a:rPr lang="da-DK" dirty="0" smtClean="0"/>
+              <a:t> of the </a:t>
+            </a:r>
+            <a:r>
+              <a:rPr lang="da-DK" dirty="0" err="1" smtClean="0"/>
+              <a:t>work</a:t>
+            </a:r>
+            <a:r>
+              <a:rPr lang="da-DK" dirty="0" smtClean="0"/>
+              <a:t> is a </a:t>
+            </a:r>
+            <a:r>
+              <a:rPr lang="da-DK" dirty="0" err="1" smtClean="0"/>
+              <a:t>refinment</a:t>
+            </a:r>
+            <a:r>
+              <a:rPr lang="da-DK" baseline="0" dirty="0" smtClean="0"/>
+              <a:t> </a:t>
+            </a:r>
+            <a:r>
+              <a:rPr lang="da-DK" baseline="0" dirty="0" err="1" smtClean="0"/>
+              <a:t>methodology</a:t>
+            </a:r>
+            <a:r>
+              <a:rPr lang="da-DK" baseline="0" dirty="0" smtClean="0"/>
+              <a:t> </a:t>
+            </a:r>
+            <a:r>
+              <a:rPr lang="da-DK" baseline="0" dirty="0" err="1" smtClean="0"/>
+              <a:t>consisting</a:t>
+            </a:r>
+            <a:r>
+              <a:rPr lang="da-DK" baseline="0" dirty="0" smtClean="0"/>
+              <a:t> of give steps </a:t>
+            </a:r>
+            <a:r>
+              <a:rPr lang="da-DK" baseline="0" dirty="0" err="1" smtClean="0"/>
+              <a:t>that</a:t>
+            </a:r>
+            <a:r>
+              <a:rPr lang="da-DK" baseline="0" dirty="0" smtClean="0"/>
+              <a:t> </a:t>
+            </a:r>
+            <a:r>
+              <a:rPr lang="da-DK" baseline="0" dirty="0" err="1" smtClean="0"/>
+              <a:t>eventually</a:t>
+            </a:r>
+            <a:r>
+              <a:rPr lang="da-DK" baseline="0" dirty="0" smtClean="0"/>
+              <a:t> </a:t>
+            </a:r>
+            <a:r>
+              <a:rPr lang="da-DK" baseline="0" dirty="0" err="1" smtClean="0"/>
+              <a:t>leads</a:t>
+            </a:r>
+            <a:r>
+              <a:rPr lang="da-DK" baseline="0" dirty="0" smtClean="0"/>
+              <a:t> to a CPN model </a:t>
+            </a:r>
+            <a:r>
+              <a:rPr lang="da-DK" baseline="0" dirty="0" err="1" smtClean="0"/>
+              <a:t>which</a:t>
+            </a:r>
+            <a:r>
+              <a:rPr lang="da-DK" baseline="0" dirty="0" smtClean="0"/>
+              <a:t> </a:t>
+            </a:r>
+            <a:r>
+              <a:rPr lang="da-DK" baseline="0" dirty="0" err="1" smtClean="0"/>
+              <a:t>contains</a:t>
+            </a:r>
+            <a:r>
+              <a:rPr lang="da-DK" baseline="0" dirty="0" smtClean="0"/>
+              <a:t> sufficient </a:t>
+            </a:r>
+            <a:r>
+              <a:rPr lang="da-DK" baseline="0" dirty="0" err="1" smtClean="0"/>
+              <a:t>details</a:t>
+            </a:r>
+            <a:r>
+              <a:rPr lang="da-DK" baseline="0" dirty="0" smtClean="0"/>
+              <a:t> to </a:t>
+            </a:r>
+            <a:r>
+              <a:rPr lang="da-DK" baseline="0" dirty="0" err="1" smtClean="0"/>
+              <a:t>allow</a:t>
+            </a:r>
+            <a:r>
+              <a:rPr lang="da-DK" baseline="0" dirty="0" smtClean="0"/>
+              <a:t> for the generation of </a:t>
+            </a:r>
+            <a:r>
+              <a:rPr lang="da-DK" baseline="0" dirty="0" err="1" smtClean="0"/>
+              <a:t>code</a:t>
+            </a:r>
+            <a:r>
+              <a:rPr lang="da-DK" baseline="0" dirty="0" smtClean="0"/>
+              <a:t>.</a:t>
+            </a:r>
+          </a:p>
+          <a:p>
+            <a:endParaRPr lang="da-DK" baseline="0" dirty="0" smtClean="0"/>
+          </a:p>
+          <a:p>
+            <a:r>
+              <a:rPr lang="da-DK" baseline="0" dirty="0" smtClean="0"/>
+              <a:t>More </a:t>
+            </a:r>
+            <a:r>
+              <a:rPr lang="da-DK" baseline="0" dirty="0" err="1" smtClean="0"/>
+              <a:t>details</a:t>
+            </a:r>
+            <a:r>
+              <a:rPr lang="da-DK" baseline="0" dirty="0" smtClean="0"/>
+              <a:t> </a:t>
+            </a:r>
+            <a:r>
+              <a:rPr lang="da-DK" baseline="0" dirty="0" err="1" smtClean="0"/>
+              <a:t>on</a:t>
+            </a:r>
+            <a:r>
+              <a:rPr lang="da-DK" baseline="0" dirty="0" smtClean="0"/>
+              <a:t> the </a:t>
+            </a:r>
+            <a:r>
+              <a:rPr lang="da-DK" baseline="0" dirty="0" err="1" smtClean="0"/>
+              <a:t>methodology</a:t>
+            </a:r>
+            <a:r>
+              <a:rPr lang="da-DK" baseline="0" dirty="0" smtClean="0"/>
+              <a:t> and the </a:t>
+            </a:r>
+            <a:r>
+              <a:rPr lang="da-DK" baseline="0" dirty="0" err="1" smtClean="0"/>
+              <a:t>tool</a:t>
+            </a:r>
+            <a:r>
+              <a:rPr lang="da-DK" baseline="0" dirty="0" smtClean="0"/>
+              <a:t> support </a:t>
+            </a:r>
+            <a:r>
+              <a:rPr lang="da-DK" baseline="0" dirty="0" err="1" smtClean="0"/>
+              <a:t>that</a:t>
+            </a:r>
+            <a:r>
+              <a:rPr lang="da-DK" baseline="0" dirty="0" smtClean="0"/>
+              <a:t> </a:t>
+            </a:r>
+            <a:r>
+              <a:rPr lang="da-DK" baseline="0" dirty="0" err="1" smtClean="0"/>
+              <a:t>we</a:t>
+            </a:r>
+            <a:r>
+              <a:rPr lang="da-DK" baseline="0" dirty="0" smtClean="0"/>
+              <a:t> have </a:t>
+            </a:r>
+            <a:r>
+              <a:rPr lang="da-DK" baseline="0" dirty="0" err="1" smtClean="0"/>
+              <a:t>developed</a:t>
+            </a:r>
+            <a:r>
+              <a:rPr lang="da-DK" baseline="0" dirty="0" smtClean="0"/>
+              <a:t> is </a:t>
+            </a:r>
+            <a:r>
+              <a:rPr lang="da-DK" baseline="0" dirty="0" err="1" smtClean="0"/>
+              <a:t>provided</a:t>
+            </a:r>
+            <a:r>
+              <a:rPr lang="da-DK" baseline="0" dirty="0" smtClean="0"/>
+              <a:t> as part of the poster session</a:t>
+            </a:r>
+            <a:endParaRPr lang="da-DK" dirty="0"/>
+          </a:p>
+        </p:txBody>
+      </p:sp>
+      <p:sp>
+        <p:nvSpPr>
+          <p:cNvPr id="4" name="Slide Number Placeholder 3"/>
+          <p:cNvSpPr>
+            <a:spLocks noGrp="1"/>
+          </p:cNvSpPr>
+          <p:nvPr>
+            <p:ph type="sldNum" sz="quarter" idx="10"/>
+          </p:nvPr>
+        </p:nvSpPr>
+        <p:spPr/>
+        <p:txBody>
+          <a:bodyPr/>
+          <a:lstStyle/>
+          <a:p>
+            <a:pPr>
+              <a:defRPr/>
+            </a:pPr>
+            <a:fld id="{D60486D3-40B4-40D5-91CB-8FD1E3EE2555}" type="slidenum">
+              <a:rPr lang="da-DK" smtClean="0"/>
+              <a:pPr>
+                <a:defRPr/>
+              </a:pPr>
+              <a:t>6</a:t>
+            </a:fld>
+            <a:endParaRPr lang="da-DK"/>
           </a:p>
         </p:txBody>
       </p:sp>
@@ -4898,8 +5968,8 @@
         </p:blipFill>
         <p:spPr bwMode="auto">
           <a:xfrm>
-            <a:off x="8265368" y="4626354"/>
-            <a:ext cx="1296144" cy="1296144"/>
+            <a:off x="8241618" y="4887604"/>
+            <a:ext cx="1152128" cy="1152128"/>
           </a:xfrm>
           <a:prstGeom prst="rect">
             <a:avLst/>
@@ -7127,7 +8197,7 @@
           <p:nvPr/>
         </p:nvPicPr>
         <p:blipFill>
-          <a:blip r:embed="rId2" cstate="print">
+          <a:blip r:embed="rId3" cstate="print">
             <a:extLst>
               <a:ext uri="{28A0092B-C50C-407E-A947-70E740481C1C}">
                 <a14:useLocalDpi xmlns="" xmlns:a14="http://schemas.microsoft.com/office/drawing/2010/main" val="0"/>
@@ -7462,7 +8532,7 @@
           <p:nvPr/>
         </p:nvPicPr>
         <p:blipFill>
-          <a:blip r:embed="rId3" cstate="print">
+          <a:blip r:embed="rId4" cstate="print">
             <a:extLst>
               <a:ext uri="{28A0092B-C50C-407E-A947-70E740481C1C}">
                 <a14:useLocalDpi xmlns="" xmlns:a14="http://schemas.microsoft.com/office/drawing/2010/main" val="0"/>
@@ -7516,7 +8586,7 @@
           <p:nvPr/>
         </p:nvPicPr>
         <p:blipFill>
-          <a:blip r:embed="rId4" cstate="print">
+          <a:blip r:embed="rId5" cstate="print">
             <a:extLst>
               <a:ext uri="{28A0092B-C50C-407E-A947-70E740481C1C}">
                 <a14:useLocalDpi xmlns="" xmlns:a14="http://schemas.microsoft.com/office/drawing/2010/main" val="0"/>
@@ -7599,7 +8669,7 @@
           <p:nvPr/>
         </p:nvPicPr>
         <p:blipFill>
-          <a:blip r:embed="rId5" cstate="print">
+          <a:blip r:embed="rId6" cstate="print">
             <a:extLst>
               <a:ext uri="{28A0092B-C50C-407E-A947-70E740481C1C}">
                 <a14:useLocalDpi xmlns="" xmlns:a14="http://schemas.microsoft.com/office/drawing/2010/main" val="0"/>
@@ -7677,7 +8747,7 @@
           <p:nvPr/>
         </p:nvPicPr>
         <p:blipFill>
-          <a:blip r:embed="rId2" cstate="print">
+          <a:blip r:embed="rId3" cstate="print">
             <a:extLst>
               <a:ext uri="{28A0092B-C50C-407E-A947-70E740481C1C}">
                 <a14:useLocalDpi xmlns="" xmlns:a14="http://schemas.microsoft.com/office/drawing/2010/main" val="0"/>
@@ -7782,7 +8852,7 @@
           <p:nvPr/>
         </p:nvPicPr>
         <p:blipFill>
-          <a:blip r:embed="rId3" cstate="print">
+          <a:blip r:embed="rId4" cstate="print">
             <a:extLst>
               <a:ext uri="{28A0092B-C50C-407E-A947-70E740481C1C}">
                 <a14:useLocalDpi xmlns="" xmlns:a14="http://schemas.microsoft.com/office/drawing/2010/main" val="0"/>
@@ -7817,7 +8887,7 @@
           <p:nvPr/>
         </p:nvPicPr>
         <p:blipFill>
-          <a:blip r:embed="rId4" cstate="print">
+          <a:blip r:embed="rId5" cstate="print">
             <a:extLst>
               <a:ext uri="{28A0092B-C50C-407E-A947-70E740481C1C}">
                 <a14:useLocalDpi xmlns="" xmlns:a14="http://schemas.microsoft.com/office/drawing/2010/main" val="0"/>
@@ -7947,7 +9017,7 @@
           <p:nvPr/>
         </p:nvPicPr>
         <p:blipFill>
-          <a:blip r:embed="rId2" cstate="print">
+          <a:blip r:embed="rId3" cstate="print">
             <a:extLst>
               <a:ext uri="{28A0092B-C50C-407E-A947-70E740481C1C}">
                 <a14:useLocalDpi xmlns="" xmlns:a14="http://schemas.microsoft.com/office/drawing/2010/main" val="0"/>
@@ -8058,7 +9128,7 @@
           <p:nvPr/>
         </p:nvPicPr>
         <p:blipFill>
-          <a:blip r:embed="rId3" cstate="print">
+          <a:blip r:embed="rId4" cstate="print">
             <a:extLst>
               <a:ext uri="{28A0092B-C50C-407E-A947-70E740481C1C}">
                 <a14:useLocalDpi xmlns="" xmlns:a14="http://schemas.microsoft.com/office/drawing/2010/main" val="0"/>
@@ -8099,7 +9169,7 @@
           <p:nvPr/>
         </p:nvPicPr>
         <p:blipFill>
-          <a:blip r:embed="rId4" cstate="print">
+          <a:blip r:embed="rId5" cstate="print">
             <a:extLst>
               <a:ext uri="{28A0092B-C50C-407E-A947-70E740481C1C}">
                 <a14:useLocalDpi xmlns="" xmlns:a14="http://schemas.microsoft.com/office/drawing/2010/main" val="0"/>

</xml_diff>